<commit_message>
Scnenes and Battle services changed to better independancy and correction of bug on move selection
</commit_message>
<xml_diff>
--- a/doc/menu.pptx
+++ b/doc/menu.pptx
@@ -105,6 +105,11 @@
       </a:defRPr>
     </a:lvl9pPr>
   </p:defaultTextStyle>
+  <p:extLst>
+    <p:ext uri="{EFAFB233-063F-42B5-8137-9DF3F51BA10A}">
+      <p15:sldGuideLst xmlns:p15="http://schemas.microsoft.com/office/powerpoint/2012/main"/>
+    </p:ext>
+  </p:extLst>
 </p:presentation>
 </file>
 
@@ -257,7 +262,7 @@
           <a:p>
             <a:fld id="{6A848BCC-239D-4BFA-8FAE-67D36FFFE04A}" type="datetimeFigureOut">
               <a:rPr lang="fr-CH" smtClean="0"/>
-              <a:t>28.10.2025</a:t>
+              <a:t>28.01.2026</a:t>
             </a:fld>
             <a:endParaRPr lang="fr-CH"/>
           </a:p>
@@ -457,7 +462,7 @@
           <a:p>
             <a:fld id="{6A848BCC-239D-4BFA-8FAE-67D36FFFE04A}" type="datetimeFigureOut">
               <a:rPr lang="fr-CH" smtClean="0"/>
-              <a:t>28.10.2025</a:t>
+              <a:t>28.01.2026</a:t>
             </a:fld>
             <a:endParaRPr lang="fr-CH"/>
           </a:p>
@@ -667,7 +672,7 @@
           <a:p>
             <a:fld id="{6A848BCC-239D-4BFA-8FAE-67D36FFFE04A}" type="datetimeFigureOut">
               <a:rPr lang="fr-CH" smtClean="0"/>
-              <a:t>28.10.2025</a:t>
+              <a:t>28.01.2026</a:t>
             </a:fld>
             <a:endParaRPr lang="fr-CH"/>
           </a:p>
@@ -867,7 +872,7 @@
           <a:p>
             <a:fld id="{6A848BCC-239D-4BFA-8FAE-67D36FFFE04A}" type="datetimeFigureOut">
               <a:rPr lang="fr-CH" smtClean="0"/>
-              <a:t>28.10.2025</a:t>
+              <a:t>28.01.2026</a:t>
             </a:fld>
             <a:endParaRPr lang="fr-CH"/>
           </a:p>
@@ -1143,7 +1148,7 @@
           <a:p>
             <a:fld id="{6A848BCC-239D-4BFA-8FAE-67D36FFFE04A}" type="datetimeFigureOut">
               <a:rPr lang="fr-CH" smtClean="0"/>
-              <a:t>28.10.2025</a:t>
+              <a:t>28.01.2026</a:t>
             </a:fld>
             <a:endParaRPr lang="fr-CH"/>
           </a:p>
@@ -1411,7 +1416,7 @@
           <a:p>
             <a:fld id="{6A848BCC-239D-4BFA-8FAE-67D36FFFE04A}" type="datetimeFigureOut">
               <a:rPr lang="fr-CH" smtClean="0"/>
-              <a:t>28.10.2025</a:t>
+              <a:t>28.01.2026</a:t>
             </a:fld>
             <a:endParaRPr lang="fr-CH"/>
           </a:p>
@@ -1826,7 +1831,7 @@
           <a:p>
             <a:fld id="{6A848BCC-239D-4BFA-8FAE-67D36FFFE04A}" type="datetimeFigureOut">
               <a:rPr lang="fr-CH" smtClean="0"/>
-              <a:t>28.10.2025</a:t>
+              <a:t>28.01.2026</a:t>
             </a:fld>
             <a:endParaRPr lang="fr-CH"/>
           </a:p>
@@ -1968,7 +1973,7 @@
           <a:p>
             <a:fld id="{6A848BCC-239D-4BFA-8FAE-67D36FFFE04A}" type="datetimeFigureOut">
               <a:rPr lang="fr-CH" smtClean="0"/>
-              <a:t>28.10.2025</a:t>
+              <a:t>28.01.2026</a:t>
             </a:fld>
             <a:endParaRPr lang="fr-CH"/>
           </a:p>
@@ -2081,7 +2086,7 @@
           <a:p>
             <a:fld id="{6A848BCC-239D-4BFA-8FAE-67D36FFFE04A}" type="datetimeFigureOut">
               <a:rPr lang="fr-CH" smtClean="0"/>
-              <a:t>28.10.2025</a:t>
+              <a:t>28.01.2026</a:t>
             </a:fld>
             <a:endParaRPr lang="fr-CH"/>
           </a:p>
@@ -2394,7 +2399,7 @@
           <a:p>
             <a:fld id="{6A848BCC-239D-4BFA-8FAE-67D36FFFE04A}" type="datetimeFigureOut">
               <a:rPr lang="fr-CH" smtClean="0"/>
-              <a:t>28.10.2025</a:t>
+              <a:t>28.01.2026</a:t>
             </a:fld>
             <a:endParaRPr lang="fr-CH"/>
           </a:p>
@@ -2683,7 +2688,7 @@
           <a:p>
             <a:fld id="{6A848BCC-239D-4BFA-8FAE-67D36FFFE04A}" type="datetimeFigureOut">
               <a:rPr lang="fr-CH" smtClean="0"/>
-              <a:t>28.10.2025</a:t>
+              <a:t>28.01.2026</a:t>
             </a:fld>
             <a:endParaRPr lang="fr-CH"/>
           </a:p>
@@ -2926,7 +2931,7 @@
           <a:p>
             <a:fld id="{6A848BCC-239D-4BFA-8FAE-67D36FFFE04A}" type="datetimeFigureOut">
               <a:rPr lang="fr-CH" smtClean="0"/>
-              <a:t>28.10.2025</a:t>
+              <a:t>28.01.2026</a:t>
             </a:fld>
             <a:endParaRPr lang="fr-CH"/>
           </a:p>
@@ -3878,6 +3883,59 @@
           </a:fontRef>
         </p:style>
       </p:cxnSp>
+      <p:sp>
+        <p:nvSpPr>
+          <p:cNvPr id="2" name="TextBox 1">
+            <a:extLst>
+              <a:ext uri="{FF2B5EF4-FFF2-40B4-BE49-F238E27FC236}">
+                <a16:creationId xmlns:a16="http://schemas.microsoft.com/office/drawing/2014/main" id="{01C35480-F330-44C7-775E-2463462B0D0C}"/>
+              </a:ext>
+            </a:extLst>
+          </p:cNvPr>
+          <p:cNvSpPr txBox="1"/>
+          <p:nvPr/>
+        </p:nvSpPr>
+        <p:spPr>
+          <a:xfrm>
+            <a:off x="1509204" y="1136342"/>
+            <a:ext cx="1353704" cy="646331"/>
+          </a:xfrm>
+          <a:prstGeom prst="rect">
+            <a:avLst/>
+          </a:prstGeom>
+          <a:noFill/>
+        </p:spPr>
+        <p:txBody>
+          <a:bodyPr wrap="none" rtlCol="0">
+            <a:spAutoFit/>
+          </a:bodyPr>
+          <a:lstStyle/>
+          <a:p>
+            <a:r>
+              <a:rPr lang="fr-CH" dirty="0" err="1"/>
+              <a:t>Tile</a:t>
+            </a:r>
+            <a:r>
+              <a:rPr lang="fr-CH" dirty="0"/>
+              <a:t> pointer:</a:t>
+            </a:r>
+            <a:br>
+              <a:rPr lang="fr-CH" dirty="0"/>
+            </a:br>
+            <a:r>
+              <a:rPr lang="fr-CH" b="0" i="0" dirty="0">
+                <a:solidFill>
+                  <a:srgbClr val="CE9178"/>
+                </a:solidFill>
+                <a:effectLst/>
+                <a:latin typeface="Consolas" panose="020B0609020204030204" pitchFamily="49" charset="0"/>
+              </a:rPr>
+              <a:t>0xC1C4</a:t>
+            </a:r>
+            <a:endParaRPr lang="fr-CH" dirty="0"/>
+          </a:p>
+        </p:txBody>
+      </p:sp>
     </p:spTree>
     <p:extLst>
       <p:ext uri="{BB962C8B-B14F-4D97-AF65-F5344CB8AC3E}">
@@ -4055,7 +4113,7 @@
           <a:p>
             <a:r>
               <a:rPr lang="fr-CH" dirty="0"/>
-              <a:t>ID = 0</a:t>
+              <a:t>ID = 1</a:t>
             </a:r>
           </a:p>
         </p:txBody>
@@ -4136,8 +4194,13 @@
           <a:p>
             <a:r>
               <a:rPr lang="fr-CH" dirty="0"/>
-              <a:t>ID = 1</a:t>
-            </a:r>
+              <a:t>ID </a:t>
+            </a:r>
+            <a:r>
+              <a:rPr lang="fr-CH"/>
+              <a:t>= 2</a:t>
+            </a:r>
+            <a:endParaRPr lang="fr-CH" dirty="0"/>
           </a:p>
         </p:txBody>
       </p:sp>
@@ -4183,6 +4246,59 @@
           </a:fontRef>
         </p:style>
       </p:cxnSp>
+      <p:sp>
+        <p:nvSpPr>
+          <p:cNvPr id="2" name="TextBox 1">
+            <a:extLst>
+              <a:ext uri="{FF2B5EF4-FFF2-40B4-BE49-F238E27FC236}">
+                <a16:creationId xmlns:a16="http://schemas.microsoft.com/office/drawing/2014/main" id="{F6E7080B-9110-C726-114B-2DFB0506F860}"/>
+              </a:ext>
+            </a:extLst>
+          </p:cNvPr>
+          <p:cNvSpPr txBox="1"/>
+          <p:nvPr/>
+        </p:nvSpPr>
+        <p:spPr>
+          <a:xfrm>
+            <a:off x="1074198" y="958788"/>
+            <a:ext cx="1353704" cy="646331"/>
+          </a:xfrm>
+          <a:prstGeom prst="rect">
+            <a:avLst/>
+          </a:prstGeom>
+          <a:noFill/>
+        </p:spPr>
+        <p:txBody>
+          <a:bodyPr wrap="none" rtlCol="0">
+            <a:spAutoFit/>
+          </a:bodyPr>
+          <a:lstStyle/>
+          <a:p>
+            <a:r>
+              <a:rPr lang="fr-CH" dirty="0" err="1"/>
+              <a:t>Tile</a:t>
+            </a:r>
+            <a:r>
+              <a:rPr lang="fr-CH" dirty="0"/>
+              <a:t> pointer:</a:t>
+            </a:r>
+            <a:br>
+              <a:rPr lang="fr-CH" dirty="0"/>
+            </a:br>
+            <a:r>
+              <a:rPr lang="fr-CH" b="0" i="0" dirty="0">
+                <a:solidFill>
+                  <a:srgbClr val="CE9178"/>
+                </a:solidFill>
+                <a:effectLst/>
+                <a:latin typeface="Consolas" panose="020B0609020204030204" pitchFamily="49" charset="0"/>
+              </a:rPr>
+              <a:t>0xA9C4</a:t>
+            </a:r>
+            <a:endParaRPr lang="fr-CH" dirty="0"/>
+          </a:p>
+        </p:txBody>
+      </p:sp>
     </p:spTree>
     <p:extLst>
       <p:ext uri="{BB962C8B-B14F-4D97-AF65-F5344CB8AC3E}">

</xml_diff>